<commit_message>
Ajout corrections dans README + maj keynotes
</commit_message>
<xml_diff>
--- a/Postgresql.pptx
+++ b/Postgresql.pptx
@@ -7154,12 +7154,12 @@
       </p:par>
     </p:tnLst>
     <p:bldLst>
+      <p:bldP build="whole" bldLvl="1" animBg="1" rev="0" advAuto="0" spid="188" grpId="2"/>
+      <p:bldP build="whole" bldLvl="1" animBg="1" rev="0" advAuto="0" spid="189" grpId="4"/>
       <p:bldP build="whole" bldLvl="1" animBg="1" rev="0" advAuto="0" spid="184" grpId="3"/>
-      <p:bldP build="whole" bldLvl="1" animBg="1" rev="0" advAuto="0" spid="182" grpId="1"/>
       <p:bldP build="whole" bldLvl="1" animBg="1" rev="0" advAuto="0" spid="186" grpId="5"/>
       <p:bldP build="whole" bldLvl="1" animBg="1" rev="0" advAuto="0" spid="190" grpId="6"/>
-      <p:bldP build="whole" bldLvl="1" animBg="1" rev="0" advAuto="0" spid="188" grpId="2"/>
-      <p:bldP build="whole" bldLvl="1" animBg="1" rev="0" advAuto="0" spid="189" grpId="4"/>
+      <p:bldP build="whole" bldLvl="1" animBg="1" rev="0" advAuto="0" spid="182" grpId="1"/>
     </p:bldLst>
   </p:timing>
 </p:sld>
@@ -7833,11 +7833,11 @@
       </p:par>
     </p:tnLst>
     <p:bldLst>
+      <p:bldP build="whole" bldLvl="1" animBg="1" rev="0" advAuto="0" spid="196" grpId="5"/>
       <p:bldP build="whole" bldLvl="1" animBg="1" rev="0" advAuto="0" spid="198" grpId="6"/>
       <p:bldP build="whole" bldLvl="1" animBg="1" rev="0" advAuto="0" spid="195" grpId="3"/>
+      <p:bldP build="whole" bldLvl="1" animBg="1" rev="0" advAuto="0" spid="196" grpId="4"/>
       <p:bldP build="whole" bldLvl="1" animBg="1" rev="0" advAuto="0" spid="194" grpId="1"/>
-      <p:bldP build="whole" bldLvl="1" animBg="1" rev="0" advAuto="0" spid="196" grpId="4"/>
-      <p:bldP build="whole" bldLvl="1" animBg="1" rev="0" advAuto="0" spid="196" grpId="5"/>
       <p:bldP build="whole" bldLvl="1" animBg="1" rev="0" advAuto="0" spid="197" grpId="2"/>
     </p:bldLst>
   </p:timing>
@@ -9433,11 +9433,11 @@
       </p:par>
     </p:tnLst>
     <p:bldLst>
+      <p:bldP build="whole" bldLvl="1" animBg="1" rev="0" advAuto="0" spid="208" grpId="2"/>
+      <p:bldP build="whole" bldLvl="1" animBg="1" rev="0" advAuto="0" spid="210" grpId="4"/>
+      <p:bldP build="whole" bldLvl="1" animBg="1" rev="0" advAuto="0" spid="209" grpId="3"/>
+      <p:bldP build="whole" bldLvl="1" animBg="1" rev="0" advAuto="0" spid="211" grpId="5"/>
       <p:bldP build="whole" bldLvl="1" animBg="1" rev="0" advAuto="0" spid="208" grpId="1"/>
-      <p:bldP build="whole" bldLvl="1" animBg="1" rev="0" advAuto="0" spid="208" grpId="2"/>
-      <p:bldP build="whole" bldLvl="1" animBg="1" rev="0" advAuto="0" spid="209" grpId="3"/>
-      <p:bldP build="whole" bldLvl="1" animBg="1" rev="0" advAuto="0" spid="210" grpId="4"/>
-      <p:bldP build="whole" bldLvl="1" animBg="1" rev="0" advAuto="0" spid="211" grpId="5"/>
     </p:bldLst>
   </p:timing>
 </p:sld>
@@ -10384,9 +10384,9 @@
       </p:par>
     </p:tnLst>
     <p:bldLst>
+      <p:bldP build="whole" bldLvl="1" animBg="1" rev="0" advAuto="0" spid="219" grpId="3"/>
+      <p:bldP build="whole" bldLvl="1" animBg="1" rev="0" advAuto="0" spid="218" grpId="2"/>
       <p:bldP build="whole" bldLvl="1" animBg="1" rev="0" advAuto="0" spid="217" grpId="1"/>
-      <p:bldP build="whole" bldLvl="1" animBg="1" rev="0" advAuto="0" spid="218" grpId="2"/>
-      <p:bldP build="whole" bldLvl="1" animBg="1" rev="0" advAuto="0" spid="219" grpId="3"/>
     </p:bldLst>
   </p:timing>
 </p:sld>
@@ -11383,11 +11383,11 @@
     </p:tnLst>
     <p:bldLst>
       <p:bldP build="whole" bldLvl="1" animBg="1" rev="0" advAuto="0" spid="231" grpId="2"/>
+      <p:bldP build="whole" bldLvl="1" animBg="1" rev="0" advAuto="0" spid="228" grpId="4"/>
+      <p:bldP build="whole" bldLvl="1" animBg="1" rev="0" advAuto="0" spid="234" grpId="9"/>
+      <p:bldP build="whole" bldLvl="1" animBg="1" rev="0" advAuto="0" spid="229" grpId="5"/>
       <p:bldP build="whole" bldLvl="1" animBg="1" rev="0" advAuto="0" spid="233" grpId="3"/>
       <p:bldP build="whole" bldLvl="1" animBg="1" rev="0" advAuto="0" spid="230" grpId="1"/>
-      <p:bldP build="whole" bldLvl="1" animBg="1" rev="0" advAuto="0" spid="229" grpId="5"/>
-      <p:bldP build="whole" bldLvl="1" animBg="1" rev="0" advAuto="0" spid="228" grpId="4"/>
-      <p:bldP build="whole" bldLvl="1" animBg="1" rev="0" advAuto="0" spid="234" grpId="9"/>
     </p:bldLst>
   </p:timing>
 </p:sld>
@@ -14124,16 +14124,16 @@
       </p:par>
     </p:tnLst>
     <p:bldLst>
+      <p:bldP build="whole" bldLvl="1" animBg="1" rev="0" advAuto="0" spid="246" grpId="2"/>
+      <p:bldP build="whole" bldLvl="1" animBg="1" rev="0" advAuto="0" spid="249" grpId="7"/>
+      <p:bldP build="whole" bldLvl="1" animBg="1" rev="0" advAuto="0" spid="250" grpId="8"/>
+      <p:bldP build="whole" bldLvl="1" animBg="1" rev="0" advAuto="0" spid="247" grpId="4"/>
+      <p:bldP build="whole" bldLvl="1" animBg="1" rev="0" advAuto="0" spid="250" grpId="9"/>
+      <p:bldP build="whole" bldLvl="1" animBg="1" rev="0" advAuto="0" spid="244" grpId="1"/>
       <p:bldP build="whole" bldLvl="1" animBg="1" rev="0" advAuto="0" spid="252" grpId="10"/>
-      <p:bldP build="whole" bldLvl="1" animBg="1" rev="0" advAuto="0" spid="250" grpId="8"/>
       <p:bldP build="whole" bldLvl="1" animBg="1" rev="0" advAuto="0" spid="251" grpId="5"/>
-      <p:bldP build="whole" bldLvl="1" animBg="1" rev="0" advAuto="0" spid="246" grpId="2"/>
+      <p:bldP build="whole" bldLvl="1" animBg="1" rev="0" advAuto="0" spid="249" grpId="6"/>
       <p:bldP build="whole" bldLvl="1" animBg="1" rev="0" advAuto="0" spid="246" grpId="3"/>
-      <p:bldP build="whole" bldLvl="1" animBg="1" rev="0" advAuto="0" spid="244" grpId="1"/>
-      <p:bldP build="whole" bldLvl="1" animBg="1" rev="0" advAuto="0" spid="249" grpId="6"/>
-      <p:bldP build="whole" bldLvl="1" animBg="1" rev="0" advAuto="0" spid="249" grpId="7"/>
-      <p:bldP build="whole" bldLvl="1" animBg="1" rev="0" advAuto="0" spid="250" grpId="9"/>
-      <p:bldP build="whole" bldLvl="1" animBg="1" rev="0" advAuto="0" spid="247" grpId="4"/>
     </p:bldLst>
   </p:timing>
 </p:sld>
@@ -14500,8 +14500,8 @@
       </p:par>
     </p:tnLst>
     <p:bldLst>
+      <p:bldP build="whole" bldLvl="1" animBg="1" rev="0" advAuto="0" spid="123" grpId="1"/>
       <p:bldP build="whole" bldLvl="1" animBg="1" rev="0" advAuto="0" spid="124" grpId="2"/>
-      <p:bldP build="whole" bldLvl="1" animBg="1" rev="0" advAuto="0" spid="123" grpId="1"/>
     </p:bldLst>
   </p:timing>
 </p:sld>
@@ -17583,13 +17583,13 @@
       </p:par>
     </p:tnLst>
     <p:bldLst>
+      <p:bldP build="whole" bldLvl="1" animBg="1" rev="0" advAuto="0" spid="265" grpId="3"/>
+      <p:bldP build="whole" bldLvl="1" animBg="1" rev="0" advAuto="0" spid="267" grpId="5"/>
       <p:bldP build="whole" bldLvl="1" animBg="1" rev="0" advAuto="0" spid="267" grpId="6"/>
+      <p:bldP build="whole" bldLvl="1" animBg="1" rev="0" advAuto="0" spid="268" grpId="7"/>
+      <p:bldP build="whole" bldLvl="1" animBg="1" rev="0" advAuto="0" spid="269" grpId="4"/>
       <p:bldP build="whole" bldLvl="1" animBg="1" rev="0" advAuto="0" spid="263" grpId="2"/>
-      <p:bldP build="whole" bldLvl="1" animBg="1" rev="0" advAuto="0" spid="265" grpId="3"/>
-      <p:bldP build="whole" bldLvl="1" animBg="1" rev="0" advAuto="0" spid="268" grpId="7"/>
       <p:bldP build="whole" bldLvl="1" animBg="1" rev="0" advAuto="0" spid="270" grpId="1"/>
-      <p:bldP build="whole" bldLvl="1" animBg="1" rev="0" advAuto="0" spid="269" grpId="4"/>
-      <p:bldP build="whole" bldLvl="1" animBg="1" rev="0" advAuto="0" spid="267" grpId="5"/>
     </p:bldLst>
   </p:timing>
 </p:sld>
@@ -18393,12 +18393,12 @@
       </p:par>
     </p:tnLst>
     <p:bldLst>
+      <p:bldP build="whole" bldLvl="1" animBg="1" rev="0" advAuto="0" spid="281" grpId="3"/>
+      <p:bldP build="whole" bldLvl="1" animBg="1" rev="0" advAuto="0" spid="277" grpId="2"/>
+      <p:bldP build="whole" bldLvl="1" animBg="1" rev="0" advAuto="0" spid="275" grpId="1"/>
       <p:bldP build="whole" bldLvl="1" animBg="1" rev="0" advAuto="0" spid="280" grpId="6"/>
-      <p:bldP build="whole" bldLvl="1" animBg="1" rev="0" advAuto="0" spid="275" grpId="1"/>
       <p:bldP build="whole" bldLvl="1" animBg="1" rev="0" advAuto="0" spid="279" grpId="4"/>
       <p:bldP build="whole" bldLvl="1" animBg="1" rev="0" advAuto="0" spid="279" grpId="5"/>
-      <p:bldP build="whole" bldLvl="1" animBg="1" rev="0" advAuto="0" spid="277" grpId="2"/>
-      <p:bldP build="whole" bldLvl="1" animBg="1" rev="0" advAuto="0" spid="281" grpId="3"/>
     </p:bldLst>
   </p:timing>
 </p:sld>
@@ -19321,13 +19321,13 @@
       </p:par>
     </p:tnLst>
     <p:bldLst>
-      <p:bldP build="whole" bldLvl="1" animBg="1" rev="0" advAuto="0" spid="291" grpId="6"/>
-      <p:bldP build="whole" bldLvl="1" animBg="1" rev="0" advAuto="0" spid="286" grpId="1"/>
       <p:bldP build="whole" bldLvl="1" animBg="1" rev="0" advAuto="0" spid="288" grpId="2"/>
       <p:bldP build="whole" bldLvl="1" animBg="1" rev="0" advAuto="0" spid="290" grpId="4"/>
       <p:bldP build="whole" bldLvl="1" animBg="1" rev="0" advAuto="0" spid="290" grpId="5"/>
+      <p:bldP build="whole" bldLvl="1" animBg="1" rev="0" advAuto="0" spid="286" grpId="1"/>
+      <p:bldP build="whole" bldLvl="1" animBg="1" rev="0" advAuto="0" spid="291" grpId="6"/>
+      <p:bldP build="whole" bldLvl="1" animBg="1" rev="0" advAuto="0" spid="293" grpId="7"/>
       <p:bldP build="whole" bldLvl="1" animBg="1" rev="0" advAuto="0" spid="292" grpId="3"/>
-      <p:bldP build="whole" bldLvl="1" animBg="1" rev="0" advAuto="0" spid="293" grpId="7"/>
     </p:bldLst>
   </p:timing>
 </p:sld>
@@ -19837,9 +19837,9 @@
       </p:par>
     </p:tnLst>
     <p:bldLst>
-      <p:bldP build="whole" bldLvl="1" animBg="1" rev="0" advAuto="0" spid="300" grpId="2"/>
       <p:bldP build="whole" bldLvl="1" animBg="1" rev="0" advAuto="0" spid="302" grpId="3"/>
       <p:bldP build="whole" bldLvl="1" animBg="1" rev="0" advAuto="0" spid="299" grpId="1"/>
+      <p:bldP build="whole" bldLvl="1" animBg="1" rev="0" advAuto="0" spid="300" grpId="2"/>
     </p:bldLst>
   </p:timing>
 </p:sld>
@@ -21039,9 +21039,9 @@
       </p:par>
     </p:tnLst>
     <p:bldLst>
+      <p:bldP build="whole" bldLvl="1" animBg="1" rev="0" advAuto="0" spid="314" grpId="1"/>
+      <p:bldP build="whole" bldLvl="1" animBg="1" rev="0" advAuto="0" spid="315" grpId="2"/>
       <p:bldP build="whole" bldLvl="1" animBg="1" rev="0" advAuto="0" spid="317" grpId="3"/>
-      <p:bldP build="whole" bldLvl="1" animBg="1" rev="0" advAuto="0" spid="315" grpId="2"/>
-      <p:bldP build="whole" bldLvl="1" animBg="1" rev="0" advAuto="0" spid="314" grpId="1"/>
     </p:bldLst>
   </p:timing>
 </p:sld>
@@ -22750,11 +22750,11 @@
       </p:par>
     </p:tnLst>
     <p:bldLst>
+      <p:bldP build="whole" bldLvl="1" animBg="1" rev="0" advAuto="0" spid="129" grpId="2"/>
+      <p:bldP build="whole" bldLvl="1" animBg="1" rev="0" advAuto="0" spid="130" grpId="3"/>
       <p:bldP build="whole" bldLvl="1" animBg="1" rev="0" advAuto="0" spid="131" grpId="4"/>
       <p:bldP build="whole" bldLvl="1" animBg="1" rev="0" advAuto="0" spid="128" grpId="1"/>
-      <p:bldP build="whole" bldLvl="1" animBg="1" rev="0" advAuto="0" spid="129" grpId="2"/>
       <p:bldP build="whole" bldLvl="1" animBg="1" rev="0" advAuto="0" spid="133" grpId="5"/>
-      <p:bldP build="whole" bldLvl="1" animBg="1" rev="0" advAuto="0" spid="130" grpId="3"/>
     </p:bldLst>
   </p:timing>
 </p:sld>
@@ -23773,9 +23773,9 @@
       </p:par>
     </p:tnLst>
     <p:bldLst>
+      <p:bldP build="whole" bldLvl="1" animBg="1" rev="0" advAuto="0" spid="334" grpId="3"/>
       <p:bldP build="whole" bldLvl="1" animBg="1" rev="0" advAuto="0" spid="331" grpId="1"/>
       <p:bldP build="whole" bldLvl="1" animBg="1" rev="0" advAuto="0" spid="332" grpId="2"/>
-      <p:bldP build="whole" bldLvl="1" animBg="1" rev="0" advAuto="0" spid="334" grpId="3"/>
     </p:bldLst>
   </p:timing>
 </p:sld>
@@ -24168,8 +24168,8 @@
       </p:par>
     </p:tnLst>
     <p:bldLst>
+      <p:bldP build="whole" bldLvl="1" animBg="1" rev="0" advAuto="0" spid="341" grpId="1"/>
       <p:bldP build="whole" bldLvl="1" animBg="1" rev="0" advAuto="0" spid="342" grpId="2"/>
-      <p:bldP build="whole" bldLvl="1" animBg="1" rev="0" advAuto="0" spid="341" grpId="1"/>
     </p:bldLst>
   </p:timing>
 </p:sld>
@@ -24640,8 +24640,8 @@
       </p:par>
     </p:tnLst>
     <p:bldLst>
+      <p:bldP build="whole" bldLvl="1" animBg="1" rev="0" advAuto="0" spid="346" grpId="1"/>
       <p:bldP build="whole" bldLvl="1" animBg="1" rev="0" advAuto="0" spid="347" grpId="2"/>
-      <p:bldP build="whole" bldLvl="1" animBg="1" rev="0" advAuto="0" spid="346" grpId="1"/>
     </p:bldLst>
   </p:timing>
 </p:sld>
@@ -25300,8 +25300,8 @@
       </p:par>
     </p:tnLst>
     <p:bldLst>
+      <p:bldP build="whole" bldLvl="1" animBg="1" rev="0" advAuto="0" spid="363" grpId="2"/>
       <p:bldP build="whole" bldLvl="1" animBg="1" rev="0" advAuto="0" spid="362" grpId="1"/>
-      <p:bldP build="whole" bldLvl="1" animBg="1" rev="0" advAuto="0" spid="363" grpId="2"/>
     </p:bldLst>
   </p:timing>
 </p:sld>
@@ -27247,9 +27247,9 @@
       </p:par>
     </p:tnLst>
     <p:bldLst>
-      <p:bldP build="whole" bldLvl="1" animBg="1" rev="0" advAuto="0" spid="386" grpId="2"/>
       <p:bldP build="whole" bldLvl="1" animBg="1" rev="0" advAuto="0" spid="388" grpId="4"/>
       <p:bldP build="whole" bldLvl="1" animBg="1" rev="0" advAuto="0" spid="387" grpId="3"/>
+      <p:bldP build="whole" bldLvl="1" animBg="1" rev="0" advAuto="0" spid="386" grpId="2"/>
     </p:bldLst>
   </p:timing>
 </p:sld>
@@ -30612,16 +30612,16 @@
       </p:par>
     </p:tnLst>
     <p:bldLst>
+      <p:bldP build="whole" bldLvl="1" animBg="1" rev="0" advAuto="0" spid="403" grpId="4"/>
+      <p:bldP build="whole" bldLvl="1" animBg="1" rev="0" advAuto="0" spid="401" grpId="2"/>
+      <p:bldP build="whole" bldLvl="1" animBg="1" rev="0" advAuto="0" spid="398" grpId="6"/>
+      <p:bldP build="whole" bldLvl="1" animBg="1" rev="0" advAuto="0" spid="402" grpId="10"/>
+      <p:bldP build="whole" bldLvl="1" animBg="1" rev="0" advAuto="0" spid="395" grpId="5"/>
+      <p:bldP build="whole" bldLvl="1" animBg="1" rev="0" advAuto="0" spid="394" grpId="3"/>
+      <p:bldP build="whole" bldLvl="1" animBg="1" rev="0" advAuto="0" spid="400" grpId="7"/>
       <p:bldP build="whole" bldLvl="1" animBg="1" rev="0" advAuto="0" spid="401" grpId="9"/>
       <p:bldP build="whole" bldLvl="1" animBg="1" rev="0" advAuto="0" spid="397" grpId="1"/>
-      <p:bldP build="whole" bldLvl="1" animBg="1" rev="0" advAuto="0" spid="400" grpId="7"/>
       <p:bldP build="whole" bldLvl="1" animBg="1" rev="0" advAuto="0" spid="404" grpId="8"/>
-      <p:bldP build="whole" bldLvl="1" animBg="1" rev="0" advAuto="0" spid="403" grpId="4"/>
-      <p:bldP build="whole" bldLvl="1" animBg="1" rev="0" advAuto="0" spid="394" grpId="3"/>
-      <p:bldP build="whole" bldLvl="1" animBg="1" rev="0" advAuto="0" spid="401" grpId="2"/>
-      <p:bldP build="whole" bldLvl="1" animBg="1" rev="0" advAuto="0" spid="398" grpId="6"/>
-      <p:bldP build="whole" bldLvl="1" animBg="1" rev="0" advAuto="0" spid="395" grpId="5"/>
-      <p:bldP build="whole" bldLvl="1" animBg="1" rev="0" advAuto="0" spid="402" grpId="10"/>
     </p:bldLst>
   </p:timing>
 </p:sld>
@@ -32274,12 +32274,12 @@
       </p:par>
     </p:tnLst>
     <p:bldLst>
-      <p:bldP build="whole" bldLvl="1" animBg="1" rev="0" advAuto="0" spid="138" grpId="6"/>
-      <p:bldP build="whole" bldLvl="1" animBg="1" rev="0" advAuto="0" spid="140" grpId="7"/>
       <p:bldP build="whole" bldLvl="1" animBg="1" rev="0" advAuto="0" spid="139" grpId="2"/>
       <p:bldP build="whole" bldLvl="1" animBg="1" rev="0" advAuto="0" spid="137" grpId="1"/>
       <p:bldP build="whole" bldLvl="1" animBg="1" rev="0" advAuto="0" spid="137" grpId="3"/>
       <p:bldP build="whole" bldLvl="1" animBg="1" rev="0" advAuto="0" spid="139" grpId="4"/>
+      <p:bldP build="whole" bldLvl="1" animBg="1" rev="0" advAuto="0" spid="138" grpId="6"/>
+      <p:bldP build="whole" bldLvl="1" animBg="1" rev="0" advAuto="0" spid="140" grpId="7"/>
     </p:bldLst>
   </p:timing>
 </p:sld>
@@ -33019,12 +33019,12 @@
       </p:par>
     </p:tnLst>
     <p:bldLst>
+      <p:bldP build="whole" bldLvl="1" animBg="1" rev="0" advAuto="0" spid="410" grpId="5"/>
       <p:bldP build="whole" bldLvl="1" animBg="1" rev="0" advAuto="0" spid="412" grpId="6"/>
       <p:bldP build="whole" bldLvl="1" animBg="1" rev="0" advAuto="0" spid="413" grpId="1"/>
       <p:bldP build="whole" bldLvl="1" animBg="1" rev="0" advAuto="0" spid="415" grpId="2"/>
       <p:bldP build="whole" bldLvl="1" animBg="1" rev="0" advAuto="0" spid="410" grpId="4"/>
       <p:bldP build="whole" bldLvl="1" animBg="1" rev="0" advAuto="0" spid="411" grpId="3"/>
-      <p:bldP build="whole" bldLvl="1" animBg="1" rev="0" advAuto="0" spid="410" grpId="5"/>
     </p:bldLst>
   </p:timing>
 </p:sld>
@@ -39423,10 +39423,10 @@
       </p:par>
     </p:tnLst>
     <p:bldLst>
-      <p:bldP build="whole" bldLvl="1" animBg="1" rev="0" advAuto="0" spid="146" grpId="7"/>
       <p:bldP build="whole" bldLvl="1" animBg="1" rev="0" advAuto="0" spid="147" grpId="5"/>
       <p:bldP build="whole" bldLvl="1" animBg="1" rev="0" advAuto="0" spid="147" grpId="6"/>
       <p:bldP build="whole" bldLvl="1" animBg="1" rev="0" advAuto="0" spid="145" grpId="1"/>
+      <p:bldP build="whole" bldLvl="1" animBg="1" rev="0" advAuto="0" spid="146" grpId="7"/>
     </p:bldLst>
   </p:timing>
 </p:sld>
@@ -41076,11 +41076,11 @@
       </p:par>
     </p:tnLst>
     <p:bldLst>
-      <p:bldP build="whole" bldLvl="1" animBg="1" rev="0" advAuto="0" spid="485" grpId="2"/>
       <p:bldP build="whole" bldLvl="1" animBg="1" rev="0" advAuto="0" spid="484" grpId="1"/>
+      <p:bldP build="whole" bldLvl="1" animBg="1" rev="0" advAuto="0" spid="483" grpId="6"/>
       <p:bldP build="whole" bldLvl="1" animBg="1" rev="0" advAuto="0" spid="484" grpId="4"/>
       <p:bldP build="whole" bldLvl="1" animBg="1" rev="0" advAuto="0" spid="485" grpId="5"/>
-      <p:bldP build="whole" bldLvl="1" animBg="1" rev="0" advAuto="0" spid="483" grpId="6"/>
+      <p:bldP build="whole" bldLvl="1" animBg="1" rev="0" advAuto="0" spid="485" grpId="2"/>
     </p:bldLst>
   </p:timing>
 </p:sld>
@@ -44342,10 +44342,10 @@
     </p:tnLst>
     <p:bldLst>
       <p:bldP build="whole" bldLvl="1" animBg="1" rev="0" advAuto="0" spid="165" grpId="2"/>
-      <p:bldP build="whole" bldLvl="1" animBg="1" rev="0" advAuto="0" spid="169" grpId="5"/>
-      <p:bldP build="whole" bldLvl="1" animBg="1" rev="0" advAuto="0" spid="167" grpId="6"/>
       <p:bldP build="whole" bldLvl="1" animBg="1" rev="0" advAuto="0" spid="170" grpId="7"/>
       <p:bldP build="whole" bldLvl="1" animBg="1" rev="0" advAuto="0" spid="168" grpId="3"/>
+      <p:bldP build="whole" bldLvl="1" animBg="1" rev="0" advAuto="0" spid="167" grpId="6"/>
+      <p:bldP build="whole" bldLvl="1" animBg="1" rev="0" advAuto="0" spid="169" grpId="5"/>
       <p:bldP build="whole" bldLvl="1" animBg="1" rev="0" advAuto="0" spid="166" grpId="4"/>
     </p:bldLst>
   </p:timing>

</xml_diff>